<commit_message>
Worked on PP slides
</commit_message>
<xml_diff>
--- a/documentation/Phase 3.pptx
+++ b/documentation/Phase 3.pptx
@@ -743,6 +743,7 @@
           <a:p>
             <a:fld id="{D65BCD19-D0A1-46D9-B99E-FC015B7B3E4E}" type="datetimeFigureOut">
               <a:rPr lang="en-US" smtClean="0"/>
+              <a:pPr/>
               <a:t>5/31/2018</a:t>
             </a:fld>
             <a:endParaRPr lang="en-GB"/>
@@ -805,6 +806,7 @@
           <a:p>
             <a:fld id="{D66D8356-3D7E-41EF-8A7A-A47B98CBB0BD}" type="slidenum">
               <a:rPr lang="en-GB" smtClean="0"/>
+              <a:pPr/>
               <a:t>‹#›</a:t>
             </a:fld>
             <a:endParaRPr lang="en-GB"/>
@@ -939,6 +941,7 @@
           <a:p>
             <a:fld id="{D65BCD19-D0A1-46D9-B99E-FC015B7B3E4E}" type="datetimeFigureOut">
               <a:rPr lang="en-US" smtClean="0"/>
+              <a:pPr/>
               <a:t>5/31/2018</a:t>
             </a:fld>
             <a:endParaRPr lang="en-GB"/>
@@ -985,6 +988,7 @@
           <a:p>
             <a:fld id="{D66D8356-3D7E-41EF-8A7A-A47B98CBB0BD}" type="slidenum">
               <a:rPr lang="en-GB" smtClean="0"/>
+              <a:pPr/>
               <a:t>‹#›</a:t>
             </a:fld>
             <a:endParaRPr lang="en-GB"/>
@@ -1124,6 +1128,7 @@
           <a:p>
             <a:fld id="{D65BCD19-D0A1-46D9-B99E-FC015B7B3E4E}" type="datetimeFigureOut">
               <a:rPr lang="en-US" smtClean="0"/>
+              <a:pPr/>
               <a:t>5/31/2018</a:t>
             </a:fld>
             <a:endParaRPr lang="en-GB"/>
@@ -1170,6 +1175,7 @@
           <a:p>
             <a:fld id="{D66D8356-3D7E-41EF-8A7A-A47B98CBB0BD}" type="slidenum">
               <a:rPr lang="en-GB" smtClean="0"/>
+              <a:pPr/>
               <a:t>‹#›</a:t>
             </a:fld>
             <a:endParaRPr lang="en-GB"/>
@@ -1274,6 +1280,7 @@
           <a:p>
             <a:fld id="{D65BCD19-D0A1-46D9-B99E-FC015B7B3E4E}" type="datetimeFigureOut">
               <a:rPr lang="en-US" smtClean="0"/>
+              <a:pPr/>
               <a:t>5/31/2018</a:t>
             </a:fld>
             <a:endParaRPr lang="en-GB"/>
@@ -1320,6 +1327,7 @@
           <a:p>
             <a:fld id="{D66D8356-3D7E-41EF-8A7A-A47B98CBB0BD}" type="slidenum">
               <a:rPr lang="en-GB" smtClean="0"/>
+              <a:pPr/>
               <a:t>‹#›</a:t>
             </a:fld>
             <a:endParaRPr lang="en-GB"/>
@@ -1529,6 +1537,7 @@
           <a:p>
             <a:fld id="{D65BCD19-D0A1-46D9-B99E-FC015B7B3E4E}" type="datetimeFigureOut">
               <a:rPr lang="en-US" smtClean="0"/>
+              <a:pPr/>
               <a:t>5/31/2018</a:t>
             </a:fld>
             <a:endParaRPr lang="en-GB"/>
@@ -1575,6 +1584,7 @@
           <a:p>
             <a:fld id="{D66D8356-3D7E-41EF-8A7A-A47B98CBB0BD}" type="slidenum">
               <a:rPr lang="en-GB" smtClean="0"/>
+              <a:pPr/>
               <a:t>‹#›</a:t>
             </a:fld>
             <a:endParaRPr lang="en-GB"/>
@@ -1938,6 +1948,7 @@
           <a:p>
             <a:fld id="{D65BCD19-D0A1-46D9-B99E-FC015B7B3E4E}" type="datetimeFigureOut">
               <a:rPr lang="en-US" smtClean="0"/>
+              <a:pPr/>
               <a:t>5/31/2018</a:t>
             </a:fld>
             <a:endParaRPr lang="en-GB"/>
@@ -1984,6 +1995,7 @@
           <a:p>
             <a:fld id="{D66D8356-3D7E-41EF-8A7A-A47B98CBB0BD}" type="slidenum">
               <a:rPr lang="en-GB" smtClean="0"/>
+              <a:pPr/>
               <a:t>‹#›</a:t>
             </a:fld>
             <a:endParaRPr lang="en-GB"/>
@@ -2384,6 +2396,7 @@
           <a:p>
             <a:fld id="{D65BCD19-D0A1-46D9-B99E-FC015B7B3E4E}" type="datetimeFigureOut">
               <a:rPr lang="en-US" smtClean="0"/>
+              <a:pPr/>
               <a:t>5/31/2018</a:t>
             </a:fld>
             <a:endParaRPr lang="en-GB"/>
@@ -2430,6 +2443,7 @@
           <a:p>
             <a:fld id="{D66D8356-3D7E-41EF-8A7A-A47B98CBB0BD}" type="slidenum">
               <a:rPr lang="en-GB" smtClean="0"/>
+              <a:pPr/>
               <a:t>‹#›</a:t>
             </a:fld>
             <a:endParaRPr lang="en-GB"/>
@@ -2485,6 +2499,7 @@
           <a:p>
             <a:fld id="{D65BCD19-D0A1-46D9-B99E-FC015B7B3E4E}" type="datetimeFigureOut">
               <a:rPr lang="en-US" smtClean="0"/>
+              <a:pPr/>
               <a:t>5/31/2018</a:t>
             </a:fld>
             <a:endParaRPr lang="en-GB"/>
@@ -2531,6 +2546,7 @@
           <a:p>
             <a:fld id="{D66D8356-3D7E-41EF-8A7A-A47B98CBB0BD}" type="slidenum">
               <a:rPr lang="en-GB" smtClean="0"/>
+              <a:pPr/>
               <a:t>‹#›</a:t>
             </a:fld>
             <a:endParaRPr lang="en-GB"/>
@@ -2606,6 +2622,7 @@
           <a:p>
             <a:fld id="{D65BCD19-D0A1-46D9-B99E-FC015B7B3E4E}" type="datetimeFigureOut">
               <a:rPr lang="en-US" smtClean="0"/>
+              <a:pPr/>
               <a:t>5/31/2018</a:t>
             </a:fld>
             <a:endParaRPr lang="en-GB"/>
@@ -2652,6 +2669,7 @@
           <a:p>
             <a:fld id="{D66D8356-3D7E-41EF-8A7A-A47B98CBB0BD}" type="slidenum">
               <a:rPr lang="en-GB" smtClean="0"/>
+              <a:pPr/>
               <a:t>‹#›</a:t>
             </a:fld>
             <a:endParaRPr lang="en-GB"/>
@@ -2880,6 +2898,7 @@
           <a:p>
             <a:fld id="{D65BCD19-D0A1-46D9-B99E-FC015B7B3E4E}" type="datetimeFigureOut">
               <a:rPr lang="en-US" smtClean="0"/>
+              <a:pPr/>
               <a:t>5/31/2018</a:t>
             </a:fld>
             <a:endParaRPr lang="en-GB"/>
@@ -2926,6 +2945,7 @@
           <a:p>
             <a:fld id="{D66D8356-3D7E-41EF-8A7A-A47B98CBB0BD}" type="slidenum">
               <a:rPr lang="en-GB" smtClean="0"/>
+              <a:pPr/>
               <a:t>‹#›</a:t>
             </a:fld>
             <a:endParaRPr lang="en-GB"/>
@@ -3085,6 +3105,7 @@
           <a:p>
             <a:fld id="{D65BCD19-D0A1-46D9-B99E-FC015B7B3E4E}" type="datetimeFigureOut">
               <a:rPr lang="en-US" smtClean="0"/>
+              <a:pPr/>
               <a:t>5/31/2018</a:t>
             </a:fld>
             <a:endParaRPr lang="en-GB"/>
@@ -3150,6 +3171,7 @@
           <a:p>
             <a:fld id="{D66D8356-3D7E-41EF-8A7A-A47B98CBB0BD}" type="slidenum">
               <a:rPr lang="en-GB" smtClean="0"/>
+              <a:pPr/>
               <a:t>‹#›</a:t>
             </a:fld>
             <a:endParaRPr lang="en-GB"/>
@@ -4194,6 +4216,7 @@
           <a:p>
             <a:fld id="{D65BCD19-D0A1-46D9-B99E-FC015B7B3E4E}" type="datetimeFigureOut">
               <a:rPr lang="en-US" smtClean="0"/>
+              <a:pPr/>
               <a:t>5/31/2018</a:t>
             </a:fld>
             <a:endParaRPr lang="en-GB"/>
@@ -4270,6 +4293,7 @@
           <a:p>
             <a:fld id="{D66D8356-3D7E-41EF-8A7A-A47B98CBB0BD}" type="slidenum">
               <a:rPr lang="en-GB" smtClean="0"/>
+              <a:pPr/>
               <a:t>‹#›</a:t>
             </a:fld>
             <a:endParaRPr lang="en-GB"/>
@@ -4687,7 +4711,11 @@
           <a:bodyPr/>
           <a:lstStyle/>
           <a:p>
-            <a:endParaRPr lang="en-GB"/>
+            <a:r>
+              <a:rPr lang="en-NZ" dirty="0" smtClean="0"/>
+              <a:t>What to discuss?</a:t>
+            </a:r>
+            <a:endParaRPr lang="en-GB" dirty="0"/>
           </a:p>
         </p:txBody>
       </p:sp>
@@ -4756,7 +4784,15 @@
           <a:p>
             <a:r>
               <a:rPr lang="en-NZ" dirty="0" smtClean="0"/>
-              <a:t>*I need numbers here*</a:t>
+              <a:t>*</a:t>
+            </a:r>
+            <a:r>
+              <a:rPr lang="en-NZ" b="1" i="1" dirty="0" smtClean="0"/>
+              <a:t>I need numbers here</a:t>
+            </a:r>
+            <a:r>
+              <a:rPr lang="en-NZ" dirty="0" smtClean="0"/>
+              <a:t>*</a:t>
             </a:r>
           </a:p>
           <a:p>
@@ -4765,8 +4801,13 @@
           <a:p>
             <a:r>
               <a:rPr lang="en-NZ" dirty="0" smtClean="0"/>
-              <a:t>Compare baseline solution with final solution</a:t>
-            </a:r>
+              <a:t>Compare baseline solution with final </a:t>
+            </a:r>
+            <a:r>
+              <a:rPr lang="en-NZ" dirty="0" smtClean="0"/>
+              <a:t>solution</a:t>
+            </a:r>
+            <a:endParaRPr lang="en-NZ" dirty="0" smtClean="0"/>
           </a:p>
         </p:txBody>
       </p:sp>
@@ -4833,6 +4874,14 @@
           <a:bodyPr/>
           <a:lstStyle/>
           <a:p>
+            <a:r>
+              <a:rPr lang="en-NZ" dirty="0" smtClean="0"/>
+              <a:t>No Hitler references here </a:t>
+            </a:r>
+            <a:r>
+              <a:rPr lang="en-NZ" dirty="0" err="1" smtClean="0"/>
+              <a:t>plz</a:t>
+            </a:r>
             <a:endParaRPr lang="en-GB" dirty="0"/>
           </a:p>
         </p:txBody>
@@ -4971,7 +5020,36 @@
           <a:bodyPr/>
           <a:lstStyle/>
           <a:p>
-            <a:endParaRPr lang="en-GB"/>
+            <a:endParaRPr lang="en-NZ" dirty="0" smtClean="0"/>
+          </a:p>
+          <a:p>
+            <a:r>
+              <a:rPr lang="en-NZ" dirty="0" smtClean="0"/>
+              <a:t>ID Tag – 8 bits</a:t>
+            </a:r>
+          </a:p>
+          <a:p>
+            <a:endParaRPr lang="en-NZ" dirty="0" smtClean="0"/>
+          </a:p>
+          <a:p>
+            <a:r>
+              <a:rPr lang="en-NZ" dirty="0" smtClean="0"/>
+              <a:t>First 3 bits identify filter type</a:t>
+            </a:r>
+          </a:p>
+          <a:p>
+            <a:endParaRPr lang="en-NZ" dirty="0" smtClean="0"/>
+          </a:p>
+          <a:p>
+            <a:r>
+              <a:rPr lang="en-NZ" dirty="0" smtClean="0"/>
+              <a:t>Last 5 bits is the number of the </a:t>
+            </a:r>
+            <a:r>
+              <a:rPr lang="en-NZ" dirty="0" smtClean="0"/>
+              <a:t>packet</a:t>
+            </a:r>
+            <a:endParaRPr lang="en-NZ" dirty="0" smtClean="0"/>
           </a:p>
         </p:txBody>
       </p:sp>
@@ -4998,11 +5076,749 @@
           </a:p>
         </p:txBody>
       </p:sp>
+      <p:graphicFrame>
+        <p:nvGraphicFramePr>
+          <p:cNvPr id="5" name="Table 4"/>
+          <p:cNvGraphicFramePr>
+            <a:graphicFrameLocks noGrp="1"/>
+          </p:cNvGraphicFramePr>
+          <p:nvPr/>
+        </p:nvGraphicFramePr>
+        <p:xfrm>
+          <a:off x="2001404" y="4774180"/>
+          <a:ext cx="6095997" cy="370840"/>
+        </p:xfrm>
+        <a:graphic>
+          <a:graphicData uri="http://schemas.openxmlformats.org/drawingml/2006/table">
+            <a:tbl>
+              <a:tblPr firstRow="1" bandRow="1">
+                <a:tableStyleId>{5940675A-B579-460E-94D1-54222C63F5DA}</a:tableStyleId>
+              </a:tblPr>
+              <a:tblGrid>
+                <a:gridCol w="677333"/>
+                <a:gridCol w="677333"/>
+                <a:gridCol w="677333"/>
+                <a:gridCol w="677333"/>
+                <a:gridCol w="677333"/>
+                <a:gridCol w="677333"/>
+                <a:gridCol w="677333"/>
+                <a:gridCol w="677333"/>
+                <a:gridCol w="677333"/>
+              </a:tblGrid>
+              <a:tr h="370840">
+                <a:tc>
+                  <a:txBody>
+                    <a:bodyPr/>
+                    <a:lstStyle/>
+                    <a:p>
+                      <a:pPr algn="ctr"/>
+                      <a:r>
+                        <a:rPr lang="en-NZ" dirty="0" smtClean="0"/>
+                        <a:t>0</a:t>
+                      </a:r>
+                      <a:endParaRPr lang="en-GB" dirty="0"/>
+                    </a:p>
+                  </a:txBody>
+                  <a:tcPr/>
+                </a:tc>
+                <a:tc>
+                  <a:txBody>
+                    <a:bodyPr/>
+                    <a:lstStyle/>
+                    <a:p>
+                      <a:pPr algn="ctr"/>
+                      <a:r>
+                        <a:rPr lang="en-NZ" dirty="0" smtClean="0"/>
+                        <a:t>1</a:t>
+                      </a:r>
+                      <a:endParaRPr lang="en-GB" dirty="0"/>
+                    </a:p>
+                  </a:txBody>
+                  <a:tcPr/>
+                </a:tc>
+                <a:tc>
+                  <a:txBody>
+                    <a:bodyPr/>
+                    <a:lstStyle/>
+                    <a:p>
+                      <a:pPr algn="ctr"/>
+                      <a:r>
+                        <a:rPr lang="en-NZ" dirty="0" smtClean="0"/>
+                        <a:t>1</a:t>
+                      </a:r>
+                      <a:endParaRPr lang="en-GB" dirty="0"/>
+                    </a:p>
+                  </a:txBody>
+                  <a:tcPr/>
+                </a:tc>
+                <a:tc>
+                  <a:txBody>
+                    <a:bodyPr/>
+                    <a:lstStyle/>
+                    <a:p>
+                      <a:pPr algn="ctr"/>
+                      <a:r>
+                        <a:rPr lang="en-NZ" dirty="0" smtClean="0"/>
+                        <a:t>0</a:t>
+                      </a:r>
+                      <a:endParaRPr lang="en-GB" dirty="0"/>
+                    </a:p>
+                  </a:txBody>
+                  <a:tcPr/>
+                </a:tc>
+                <a:tc>
+                  <a:txBody>
+                    <a:bodyPr/>
+                    <a:lstStyle/>
+                    <a:p>
+                      <a:pPr algn="ctr"/>
+                      <a:r>
+                        <a:rPr lang="en-NZ" dirty="0" smtClean="0"/>
+                        <a:t>0</a:t>
+                      </a:r>
+                      <a:endParaRPr lang="en-GB" dirty="0"/>
+                    </a:p>
+                  </a:txBody>
+                  <a:tcPr/>
+                </a:tc>
+                <a:tc>
+                  <a:txBody>
+                    <a:bodyPr/>
+                    <a:lstStyle/>
+                    <a:p>
+                      <a:pPr algn="ctr"/>
+                      <a:r>
+                        <a:rPr lang="en-NZ" dirty="0" smtClean="0"/>
+                        <a:t>0</a:t>
+                      </a:r>
+                      <a:endParaRPr lang="en-GB" dirty="0"/>
+                    </a:p>
+                  </a:txBody>
+                  <a:tcPr/>
+                </a:tc>
+                <a:tc>
+                  <a:txBody>
+                    <a:bodyPr/>
+                    <a:lstStyle/>
+                    <a:p>
+                      <a:pPr algn="ctr"/>
+                      <a:r>
+                        <a:rPr lang="en-NZ" dirty="0" smtClean="0"/>
+                        <a:t>0</a:t>
+                      </a:r>
+                      <a:endParaRPr lang="en-GB" dirty="0"/>
+                    </a:p>
+                  </a:txBody>
+                  <a:tcPr/>
+                </a:tc>
+                <a:tc>
+                  <a:txBody>
+                    <a:bodyPr/>
+                    <a:lstStyle/>
+                    <a:p>
+                      <a:pPr algn="ctr"/>
+                      <a:r>
+                        <a:rPr lang="en-NZ" dirty="0" smtClean="0"/>
+                        <a:t>0</a:t>
+                      </a:r>
+                      <a:endParaRPr lang="en-GB" dirty="0"/>
+                    </a:p>
+                  </a:txBody>
+                  <a:tcPr/>
+                </a:tc>
+                <a:tc>
+                  <a:txBody>
+                    <a:bodyPr/>
+                    <a:lstStyle/>
+                    <a:p>
+                      <a:pPr algn="ctr"/>
+                      <a:r>
+                        <a:rPr lang="en-NZ" dirty="0" smtClean="0"/>
+                        <a:t>1</a:t>
+                      </a:r>
+                      <a:endParaRPr lang="en-GB" dirty="0"/>
+                    </a:p>
+                  </a:txBody>
+                  <a:tcPr/>
+                </a:tc>
+              </a:tr>
+            </a:tbl>
+          </a:graphicData>
+        </a:graphic>
+      </p:graphicFrame>
+      <p:grpSp>
+        <p:nvGrpSpPr>
+          <p:cNvPr id="11" name="Group 10"/>
+          <p:cNvGrpSpPr/>
+          <p:nvPr/>
+        </p:nvGrpSpPr>
+        <p:grpSpPr>
+          <a:xfrm>
+            <a:off x="1071538" y="4774180"/>
+            <a:ext cx="7000924" cy="1226588"/>
+            <a:chOff x="285720" y="4572008"/>
+            <a:chExt cx="7000924" cy="1226588"/>
+          </a:xfrm>
+        </p:grpSpPr>
+        <p:sp>
+          <p:nvSpPr>
+            <p:cNvPr id="6" name="TextBox 5"/>
+            <p:cNvSpPr txBox="1"/>
+            <p:nvPr/>
+          </p:nvSpPr>
+          <p:spPr>
+            <a:xfrm>
+              <a:off x="285720" y="4572008"/>
+              <a:ext cx="915635" cy="369332"/>
+            </a:xfrm>
+            <a:prstGeom prst="rect">
+              <a:avLst/>
+            </a:prstGeom>
+            <a:noFill/>
+          </p:spPr>
+          <p:txBody>
+            <a:bodyPr wrap="none" rtlCol="0">
+              <a:spAutoFit/>
+            </a:bodyPr>
+            <a:lstStyle/>
+            <a:p>
+              <a:r>
+                <a:rPr lang="en-NZ" b="1" dirty="0" smtClean="0"/>
+                <a:t>ID Tag</a:t>
+              </a:r>
+              <a:endParaRPr lang="en-GB" b="1" dirty="0"/>
+            </a:p>
+          </p:txBody>
+        </p:sp>
+        <p:sp>
+          <p:nvSpPr>
+            <p:cNvPr id="7" name="Right Brace 6"/>
+            <p:cNvSpPr/>
+            <p:nvPr/>
+          </p:nvSpPr>
+          <p:spPr>
+            <a:xfrm rot="5400000">
+              <a:off x="2035951" y="4179099"/>
+              <a:ext cx="357190" cy="2000264"/>
+            </a:xfrm>
+            <a:prstGeom prst="rightBrace">
+              <a:avLst/>
+            </a:prstGeom>
+            <a:ln w="12700"/>
+          </p:spPr>
+          <p:style>
+            <a:lnRef idx="1">
+              <a:schemeClr val="dk1"/>
+            </a:lnRef>
+            <a:fillRef idx="0">
+              <a:schemeClr val="dk1"/>
+            </a:fillRef>
+            <a:effectRef idx="0">
+              <a:schemeClr val="dk1"/>
+            </a:effectRef>
+            <a:fontRef idx="minor">
+              <a:schemeClr val="tx1"/>
+            </a:fontRef>
+          </p:style>
+          <p:txBody>
+            <a:bodyPr rtlCol="0" anchor="ctr"/>
+            <a:lstStyle/>
+            <a:p>
+              <a:pPr algn="ctr"/>
+              <a:endParaRPr lang="en-GB"/>
+            </a:p>
+          </p:txBody>
+        </p:sp>
+        <p:sp>
+          <p:nvSpPr>
+            <p:cNvPr id="8" name="Right Brace 7"/>
+            <p:cNvSpPr/>
+            <p:nvPr/>
+          </p:nvSpPr>
+          <p:spPr>
+            <a:xfrm rot="5400000">
+              <a:off x="5107785" y="3178967"/>
+              <a:ext cx="357190" cy="4000528"/>
+            </a:xfrm>
+            <a:prstGeom prst="rightBrace">
+              <a:avLst/>
+            </a:prstGeom>
+            <a:ln w="12700"/>
+          </p:spPr>
+          <p:style>
+            <a:lnRef idx="1">
+              <a:schemeClr val="dk1"/>
+            </a:lnRef>
+            <a:fillRef idx="0">
+              <a:schemeClr val="dk1"/>
+            </a:fillRef>
+            <a:effectRef idx="0">
+              <a:schemeClr val="dk1"/>
+            </a:effectRef>
+            <a:fontRef idx="minor">
+              <a:schemeClr val="tx1"/>
+            </a:fontRef>
+          </p:style>
+          <p:txBody>
+            <a:bodyPr rtlCol="0" anchor="ctr"/>
+            <a:lstStyle/>
+            <a:p>
+              <a:pPr algn="ctr"/>
+              <a:endParaRPr lang="en-GB"/>
+            </a:p>
+          </p:txBody>
+        </p:sp>
+        <p:sp>
+          <p:nvSpPr>
+            <p:cNvPr id="9" name="TextBox 8"/>
+            <p:cNvSpPr txBox="1"/>
+            <p:nvPr/>
+          </p:nvSpPr>
+          <p:spPr>
+            <a:xfrm>
+              <a:off x="1571604" y="5429264"/>
+              <a:ext cx="1306768" cy="369332"/>
+            </a:xfrm>
+            <a:prstGeom prst="rect">
+              <a:avLst/>
+            </a:prstGeom>
+            <a:noFill/>
+          </p:spPr>
+          <p:txBody>
+            <a:bodyPr wrap="none" rtlCol="0">
+              <a:spAutoFit/>
+            </a:bodyPr>
+            <a:lstStyle/>
+            <a:p>
+              <a:r>
+                <a:rPr lang="en-NZ" dirty="0" smtClean="0"/>
+                <a:t>Filter type</a:t>
+              </a:r>
+              <a:endParaRPr lang="en-GB" dirty="0"/>
+            </a:p>
+          </p:txBody>
+        </p:sp>
+        <p:sp>
+          <p:nvSpPr>
+            <p:cNvPr id="10" name="TextBox 9"/>
+            <p:cNvSpPr txBox="1"/>
+            <p:nvPr/>
+          </p:nvSpPr>
+          <p:spPr>
+            <a:xfrm>
+              <a:off x="4429124" y="5429264"/>
+              <a:ext cx="1851789" cy="369332"/>
+            </a:xfrm>
+            <a:prstGeom prst="rect">
+              <a:avLst/>
+            </a:prstGeom>
+            <a:noFill/>
+          </p:spPr>
+          <p:txBody>
+            <a:bodyPr wrap="none" rtlCol="0">
+              <a:spAutoFit/>
+            </a:bodyPr>
+            <a:lstStyle/>
+            <a:p>
+              <a:r>
+                <a:rPr lang="en-NZ" dirty="0" smtClean="0"/>
+                <a:t>Packet number</a:t>
+              </a:r>
+              <a:endParaRPr lang="en-GB" dirty="0"/>
+            </a:p>
+          </p:txBody>
+        </p:sp>
+      </p:grpSp>
+      <p:graphicFrame>
+        <p:nvGraphicFramePr>
+          <p:cNvPr id="13" name="Table 12"/>
+          <p:cNvGraphicFramePr>
+            <a:graphicFrameLocks noGrp="1"/>
+          </p:cNvGraphicFramePr>
+          <p:nvPr/>
+        </p:nvGraphicFramePr>
+        <p:xfrm>
+          <a:off x="4500562" y="214290"/>
+          <a:ext cx="3705860" cy="2194560"/>
+        </p:xfrm>
+        <a:graphic>
+          <a:graphicData uri="http://schemas.openxmlformats.org/drawingml/2006/table">
+            <a:tbl>
+              <a:tblPr firstRow="1" bandRow="1">
+                <a:tableStyleId>{9D7B26C5-4107-4FEC-AEDC-1716B250A1EF}</a:tableStyleId>
+              </a:tblPr>
+              <a:tblGrid>
+                <a:gridCol w="1852930"/>
+                <a:gridCol w="1852930"/>
+              </a:tblGrid>
+              <a:tr h="329405">
+                <a:tc>
+                  <a:txBody>
+                    <a:bodyPr/>
+                    <a:lstStyle/>
+                    <a:p>
+                      <a:pPr algn="ctr"/>
+                      <a:r>
+                        <a:rPr lang="en-NZ" dirty="0" smtClean="0"/>
+                        <a:t>Filter</a:t>
+                      </a:r>
+                      <a:r>
+                        <a:rPr lang="en-NZ" baseline="0" dirty="0" smtClean="0"/>
+                        <a:t> type bits</a:t>
+                      </a:r>
+                      <a:endParaRPr lang="en-GB" dirty="0"/>
+                    </a:p>
+                  </a:txBody>
+                  <a:tcPr/>
+                </a:tc>
+                <a:tc>
+                  <a:txBody>
+                    <a:bodyPr/>
+                    <a:lstStyle/>
+                    <a:p>
+                      <a:pPr algn="ctr"/>
+                      <a:r>
+                        <a:rPr lang="en-NZ" dirty="0" smtClean="0"/>
+                        <a:t>Filter</a:t>
+                      </a:r>
+                      <a:endParaRPr lang="en-GB" dirty="0"/>
+                    </a:p>
+                  </a:txBody>
+                  <a:tcPr/>
+                </a:tc>
+              </a:tr>
+              <a:tr h="329405">
+                <a:tc>
+                  <a:txBody>
+                    <a:bodyPr/>
+                    <a:lstStyle/>
+                    <a:p>
+                      <a:pPr algn="ctr"/>
+                      <a:r>
+                        <a:rPr lang="en-NZ" dirty="0" smtClean="0"/>
+                        <a:t>000</a:t>
+                      </a:r>
+                      <a:endParaRPr lang="en-GB" dirty="0"/>
+                    </a:p>
+                  </a:txBody>
+                  <a:tcPr/>
+                </a:tc>
+                <a:tc>
+                  <a:txBody>
+                    <a:bodyPr/>
+                    <a:lstStyle/>
+                    <a:p>
+                      <a:pPr algn="ctr"/>
+                      <a:r>
+                        <a:rPr lang="en-NZ" dirty="0" smtClean="0"/>
+                        <a:t>Edge filter</a:t>
+                      </a:r>
+                      <a:endParaRPr lang="en-GB" dirty="0"/>
+                    </a:p>
+                  </a:txBody>
+                  <a:tcPr/>
+                </a:tc>
+              </a:tr>
+              <a:tr h="329405">
+                <a:tc>
+                  <a:txBody>
+                    <a:bodyPr/>
+                    <a:lstStyle/>
+                    <a:p>
+                      <a:pPr algn="ctr"/>
+                      <a:r>
+                        <a:rPr lang="en-NZ" dirty="0" smtClean="0"/>
+                        <a:t>001</a:t>
+                      </a:r>
+                      <a:endParaRPr lang="en-GB" dirty="0"/>
+                    </a:p>
+                  </a:txBody>
+                  <a:tcPr/>
+                </a:tc>
+                <a:tc>
+                  <a:txBody>
+                    <a:bodyPr/>
+                    <a:lstStyle/>
+                    <a:p>
+                      <a:pPr algn="ctr"/>
+                      <a:r>
+                        <a:rPr lang="en-NZ" dirty="0" smtClean="0"/>
+                        <a:t>Gaussian</a:t>
+                      </a:r>
+                      <a:r>
+                        <a:rPr lang="en-NZ" dirty="0" smtClean="0"/>
+                        <a:t> filter</a:t>
+                      </a:r>
+                      <a:endParaRPr lang="en-GB" dirty="0"/>
+                    </a:p>
+                  </a:txBody>
+                  <a:tcPr/>
+                </a:tc>
+              </a:tr>
+              <a:tr h="329405">
+                <a:tc>
+                  <a:txBody>
+                    <a:bodyPr/>
+                    <a:lstStyle/>
+                    <a:p>
+                      <a:pPr algn="ctr"/>
+                      <a:r>
+                        <a:rPr lang="en-NZ" dirty="0" smtClean="0"/>
+                        <a:t>010</a:t>
+                      </a:r>
+                      <a:endParaRPr lang="en-GB" dirty="0"/>
+                    </a:p>
+                  </a:txBody>
+                  <a:tcPr/>
+                </a:tc>
+                <a:tc>
+                  <a:txBody>
+                    <a:bodyPr/>
+                    <a:lstStyle/>
+                    <a:p>
+                      <a:pPr algn="ctr"/>
+                      <a:r>
+                        <a:rPr lang="en-NZ" dirty="0" smtClean="0"/>
+                        <a:t>Identity</a:t>
+                      </a:r>
+                      <a:r>
+                        <a:rPr lang="en-NZ" dirty="0" smtClean="0"/>
+                        <a:t> filter</a:t>
+                      </a:r>
+                      <a:endParaRPr lang="en-GB" dirty="0"/>
+                    </a:p>
+                  </a:txBody>
+                  <a:tcPr/>
+                </a:tc>
+              </a:tr>
+              <a:tr h="329405">
+                <a:tc>
+                  <a:txBody>
+                    <a:bodyPr/>
+                    <a:lstStyle/>
+                    <a:p>
+                      <a:pPr algn="ctr"/>
+                      <a:r>
+                        <a:rPr lang="en-NZ" dirty="0" smtClean="0"/>
+                        <a:t>011</a:t>
+                      </a:r>
+                      <a:endParaRPr lang="en-GB" dirty="0"/>
+                    </a:p>
+                  </a:txBody>
+                  <a:tcPr/>
+                </a:tc>
+                <a:tc>
+                  <a:txBody>
+                    <a:bodyPr/>
+                    <a:lstStyle/>
+                    <a:p>
+                      <a:pPr algn="ctr"/>
+                      <a:r>
+                        <a:rPr lang="en-NZ" dirty="0" smtClean="0"/>
+                        <a:t>Median</a:t>
+                      </a:r>
+                      <a:r>
+                        <a:rPr lang="en-NZ" dirty="0" smtClean="0"/>
+                        <a:t> filter</a:t>
+                      </a:r>
+                      <a:endParaRPr lang="en-GB" dirty="0"/>
+                    </a:p>
+                  </a:txBody>
+                  <a:tcPr/>
+                </a:tc>
+              </a:tr>
+              <a:tr h="329405">
+                <a:tc>
+                  <a:txBody>
+                    <a:bodyPr/>
+                    <a:lstStyle/>
+                    <a:p>
+                      <a:pPr algn="ctr"/>
+                      <a:r>
+                        <a:rPr lang="en-NZ" dirty="0" smtClean="0"/>
+                        <a:t>1XX</a:t>
+                      </a:r>
+                      <a:endParaRPr lang="en-GB" dirty="0"/>
+                    </a:p>
+                  </a:txBody>
+                  <a:tcPr/>
+                </a:tc>
+                <a:tc>
+                  <a:txBody>
+                    <a:bodyPr/>
+                    <a:lstStyle/>
+                    <a:p>
+                      <a:pPr algn="ctr"/>
+                      <a:r>
+                        <a:rPr lang="en-NZ" dirty="0" smtClean="0"/>
+                        <a:t>Sobel</a:t>
+                      </a:r>
+                      <a:r>
+                        <a:rPr lang="en-NZ" dirty="0" smtClean="0"/>
+                        <a:t> filter</a:t>
+                      </a:r>
+                      <a:endParaRPr lang="en-GB" dirty="0"/>
+                    </a:p>
+                  </a:txBody>
+                  <a:tcPr/>
+                </a:tc>
+              </a:tr>
+            </a:tbl>
+          </a:graphicData>
+        </a:graphic>
+      </p:graphicFrame>
     </p:spTree>
   </p:cSld>
   <p:clrMapOvr>
     <a:masterClrMapping/>
   </p:clrMapOvr>
+  <p:timing>
+    <p:tnLst>
+      <p:par>
+        <p:cTn id="1" dur="indefinite" restart="never" nodeType="tmRoot">
+          <p:childTnLst>
+            <p:seq concurrent="1" nextAc="seek">
+              <p:cTn id="2" dur="indefinite" nodeType="mainSeq">
+                <p:childTnLst>
+                  <p:par>
+                    <p:cTn id="3" fill="hold">
+                      <p:stCondLst>
+                        <p:cond delay="indefinite"/>
+                      </p:stCondLst>
+                      <p:childTnLst>
+                        <p:par>
+                          <p:cTn id="4" fill="hold">
+                            <p:stCondLst>
+                              <p:cond delay="0"/>
+                            </p:stCondLst>
+                            <p:childTnLst>
+                              <p:par>
+                                <p:cTn id="5" presetID="1" presetClass="entr" presetSubtype="0" fill="hold" nodeType="clickEffect">
+                                  <p:stCondLst>
+                                    <p:cond delay="0"/>
+                                  </p:stCondLst>
+                                  <p:childTnLst>
+                                    <p:set>
+                                      <p:cBhvr>
+                                        <p:cTn id="6" dur="1" fill="hold">
+                                          <p:stCondLst>
+                                            <p:cond delay="0"/>
+                                          </p:stCondLst>
+                                        </p:cTn>
+                                        <p:tgtEl>
+                                          <p:spTgt spid="11"/>
+                                        </p:tgtEl>
+                                        <p:attrNameLst>
+                                          <p:attrName>style.visibility</p:attrName>
+                                        </p:attrNameLst>
+                                      </p:cBhvr>
+                                      <p:to>
+                                        <p:strVal val="visible"/>
+                                      </p:to>
+                                    </p:set>
+                                  </p:childTnLst>
+                                </p:cTn>
+                              </p:par>
+                              <p:par>
+                                <p:cTn id="7" presetID="1" presetClass="entr" presetSubtype="0" fill="hold" nodeType="withEffect">
+                                  <p:stCondLst>
+                                    <p:cond delay="0"/>
+                                  </p:stCondLst>
+                                  <p:childTnLst>
+                                    <p:set>
+                                      <p:cBhvr>
+                                        <p:cTn id="8" dur="1" fill="hold">
+                                          <p:stCondLst>
+                                            <p:cond delay="0"/>
+                                          </p:stCondLst>
+                                        </p:cTn>
+                                        <p:tgtEl>
+                                          <p:spTgt spid="5"/>
+                                        </p:tgtEl>
+                                        <p:attrNameLst>
+                                          <p:attrName>style.visibility</p:attrName>
+                                        </p:attrNameLst>
+                                      </p:cBhvr>
+                                      <p:to>
+                                        <p:strVal val="visible"/>
+                                      </p:to>
+                                    </p:set>
+                                  </p:childTnLst>
+                                </p:cTn>
+                              </p:par>
+                            </p:childTnLst>
+                          </p:cTn>
+                        </p:par>
+                      </p:childTnLst>
+                    </p:cTn>
+                  </p:par>
+                  <p:par>
+                    <p:cTn id="9" fill="hold">
+                      <p:stCondLst>
+                        <p:cond delay="indefinite"/>
+                      </p:stCondLst>
+                      <p:childTnLst>
+                        <p:par>
+                          <p:cTn id="10" fill="hold">
+                            <p:stCondLst>
+                              <p:cond delay="0"/>
+                            </p:stCondLst>
+                            <p:childTnLst>
+                              <p:par>
+                                <p:cTn id="11" presetID="1" presetClass="entr" presetSubtype="0" fill="hold" nodeType="clickEffect">
+                                  <p:stCondLst>
+                                    <p:cond delay="0"/>
+                                  </p:stCondLst>
+                                  <p:childTnLst>
+                                    <p:set>
+                                      <p:cBhvr>
+                                        <p:cTn id="12" dur="1" fill="hold">
+                                          <p:stCondLst>
+                                            <p:cond delay="0"/>
+                                          </p:stCondLst>
+                                        </p:cTn>
+                                        <p:tgtEl>
+                                          <p:spTgt spid="13"/>
+                                        </p:tgtEl>
+                                        <p:attrNameLst>
+                                          <p:attrName>style.visibility</p:attrName>
+                                        </p:attrNameLst>
+                                      </p:cBhvr>
+                                      <p:to>
+                                        <p:strVal val="visible"/>
+                                      </p:to>
+                                    </p:set>
+                                  </p:childTnLst>
+                                </p:cTn>
+                              </p:par>
+                            </p:childTnLst>
+                          </p:cTn>
+                        </p:par>
+                      </p:childTnLst>
+                    </p:cTn>
+                  </p:par>
+                </p:childTnLst>
+              </p:cTn>
+              <p:prevCondLst>
+                <p:cond evt="onPrev" delay="0">
+                  <p:tgtEl>
+                    <p:sldTgt/>
+                  </p:tgtEl>
+                </p:cond>
+              </p:prevCondLst>
+              <p:nextCondLst>
+                <p:cond evt="onNext" delay="0">
+                  <p:tgtEl>
+                    <p:sldTgt/>
+                  </p:tgtEl>
+                </p:cond>
+              </p:nextCondLst>
+            </p:seq>
+          </p:childTnLst>
+        </p:cTn>
+      </p:par>
+    </p:tnLst>
+  </p:timing>
 </p:sld>
 </file>
 
@@ -5152,6 +5968,13 @@
   <p:clrMapOvr>
     <a:masterClrMapping/>
   </p:clrMapOvr>
+  <p:timing>
+    <p:tnLst>
+      <p:par>
+        <p:cTn id="1" dur="indefinite" restart="never" nodeType="tmRoot"/>
+      </p:par>
+    </p:tnLst>
+  </p:timing>
 </p:sld>
 </file>
 
@@ -5187,7 +6010,7 @@
           <a:bodyPr/>
           <a:lstStyle/>
           <a:p>
-            <a:endParaRPr lang="en-GB"/>
+            <a:endParaRPr lang="en-GB" dirty="0"/>
           </a:p>
         </p:txBody>
       </p:sp>
@@ -5254,7 +6077,7 @@
           <a:bodyPr/>
           <a:lstStyle/>
           <a:p>
-            <a:endParaRPr lang="en-GB"/>
+            <a:endParaRPr lang="en-GB" dirty="0"/>
           </a:p>
         </p:txBody>
       </p:sp>
@@ -5322,12 +6145,14 @@
         </p:nvSpPr>
         <p:spPr/>
         <p:txBody>
-          <a:bodyPr/>
+          <a:bodyPr>
+            <a:noAutofit/>
+          </a:bodyPr>
           <a:lstStyle/>
           <a:p>
             <a:r>
               <a:rPr lang="en-NZ" dirty="0" smtClean="0"/>
-              <a:t>Changed from columns to row</a:t>
+              <a:t>Array was being accessed using a column-major logic</a:t>
             </a:r>
           </a:p>
           <a:p>
@@ -5336,7 +6161,25 @@
           <a:p>
             <a:r>
               <a:rPr lang="en-NZ" dirty="0" smtClean="0"/>
-              <a:t>Improved by 13.82%</a:t>
+              <a:t>Caused a lot of cache misses since C uses row-major logic</a:t>
+            </a:r>
+            <a:endParaRPr lang="en-NZ" dirty="0" smtClean="0"/>
+          </a:p>
+          <a:p>
+            <a:endParaRPr lang="en-NZ" dirty="0" smtClean="0"/>
+          </a:p>
+          <a:p>
+            <a:r>
+              <a:rPr lang="en-NZ" dirty="0" smtClean="0"/>
+              <a:t>Observed a time improvement of </a:t>
+            </a:r>
+            <a:r>
+              <a:rPr lang="en-NZ" dirty="0" smtClean="0"/>
+              <a:t>13.82</a:t>
+            </a:r>
+            <a:r>
+              <a:rPr lang="en-NZ" dirty="0" smtClean="0"/>
+              <a:t>% afterwards</a:t>
             </a:r>
             <a:endParaRPr lang="en-GB" dirty="0"/>
           </a:p>
@@ -5407,8 +6250,15 @@
           <a:p>
             <a:r>
               <a:rPr lang="en-NZ" dirty="0" smtClean="0"/>
-              <a:t>Daisy chaining</a:t>
-            </a:r>
+              <a:t>Daisy </a:t>
+            </a:r>
+            <a:r>
+              <a:rPr lang="en-NZ" dirty="0" smtClean="0"/>
+              <a:t>chaining</a:t>
+            </a:r>
+          </a:p>
+          <a:p>
+            <a:endParaRPr lang="en-NZ" dirty="0" smtClean="0"/>
           </a:p>
           <a:p>
             <a:r>
@@ -5417,6 +6267,13 @@
             </a:r>
           </a:p>
           <a:p>
+            <a:endParaRPr lang="en-NZ" dirty="0" smtClean="0"/>
+          </a:p>
+          <a:p>
+            <a:r>
+              <a:rPr lang="en-NZ" dirty="0" smtClean="0"/>
+              <a:t>Anything else?</a:t>
+            </a:r>
             <a:endParaRPr lang="en-GB" dirty="0"/>
           </a:p>
         </p:txBody>

</xml_diff>